<commit_message>
added slides for explaining the RVQ and the discriminator
</commit_message>
<xml_diff>
--- a/lectures/6. Neural audio compression.pptx
+++ b/lectures/6. Neural audio compression.pptx
@@ -5,7 +5,7 @@
     <p:sldMasterId id="2147483659" r:id="rId1"/>
   </p:sldMasterIdLst>
   <p:notesMasterIdLst>
-    <p:notesMasterId r:id="rId25"/>
+    <p:notesMasterId r:id="rId28"/>
   </p:notesMasterIdLst>
   <p:sldIdLst>
     <p:sldId id="256" r:id="rId2"/>
@@ -28,26 +28,29 @@
     <p:sldId id="272" r:id="rId19"/>
     <p:sldId id="273" r:id="rId20"/>
     <p:sldId id="277" r:id="rId21"/>
-    <p:sldId id="278" r:id="rId22"/>
-    <p:sldId id="274" r:id="rId23"/>
-    <p:sldId id="276" r:id="rId24"/>
+    <p:sldId id="279" r:id="rId22"/>
+    <p:sldId id="280" r:id="rId23"/>
+    <p:sldId id="281" r:id="rId24"/>
+    <p:sldId id="278" r:id="rId25"/>
+    <p:sldId id="274" r:id="rId26"/>
+    <p:sldId id="276" r:id="rId27"/>
   </p:sldIdLst>
   <p:sldSz cx="9144000" cy="5143500" type="screen16x9"/>
   <p:notesSz cx="6858000" cy="9144000"/>
   <p:embeddedFontLst>
     <p:embeddedFont>
       <p:font typeface="Lato" panose="020F0502020204030203" pitchFamily="34" charset="0"/>
-      <p:regular r:id="rId26"/>
-      <p:bold r:id="rId27"/>
-      <p:italic r:id="rId28"/>
-      <p:boldItalic r:id="rId29"/>
+      <p:regular r:id="rId29"/>
+      <p:bold r:id="rId30"/>
+      <p:italic r:id="rId31"/>
+      <p:boldItalic r:id="rId32"/>
     </p:embeddedFont>
     <p:embeddedFont>
       <p:font typeface="Raleway" pitchFamily="2" charset="77"/>
-      <p:regular r:id="rId30"/>
-      <p:bold r:id="rId31"/>
-      <p:italic r:id="rId32"/>
-      <p:boldItalic r:id="rId33"/>
+      <p:regular r:id="rId33"/>
+      <p:bold r:id="rId34"/>
+      <p:italic r:id="rId35"/>
+      <p:boldItalic r:id="rId36"/>
     </p:embeddedFont>
   </p:embeddedFontLst>
   <p:defaultTextStyle>
@@ -1808,7 +1811,7 @@
         </p:nvSpPr>
         <p:spPr>
           <a:xfrm>
-            <a:off x="381300" y="685800"/>
+            <a:off x="381000" y="685800"/>
             <a:ext cx="6096000" cy="3429000"/>
           </a:xfrm>
           <a:custGeom>
@@ -9186,7 +9189,7 @@
             </a:pPr>
             <a:r>
               <a:rPr lang="en" dirty="0"/>
-              <a:t>Challenges in Deep Learning for Audio Coding</a:t>
+              <a:t>Challenges (current limitations)</a:t>
             </a:r>
             <a:endParaRPr dirty="0"/>
           </a:p>
@@ -9328,7 +9331,7 @@
           <p:cNvPr id="2" name="Title 1">
             <a:extLst>
               <a:ext uri="{FF2B5EF4-FFF2-40B4-BE49-F238E27FC236}">
-                <a16:creationId xmlns:a16="http://schemas.microsoft.com/office/drawing/2014/main" id="{5844F49E-F3E9-EC2A-AF5C-735A2689F9B2}"/>
+                <a16:creationId xmlns:a16="http://schemas.microsoft.com/office/drawing/2014/main" id="{1ECD3611-ED2E-7A41-B2DB-EE48866A6DB1}"/>
               </a:ext>
             </a:extLst>
           </p:cNvPr>
@@ -9347,10 +9350,9 @@
           <a:lstStyle/>
           <a:p>
             <a:r>
-              <a:rPr lang="en-US" dirty="0" err="1"/>
-              <a:t>Pytorch</a:t>
-            </a:r>
-            <a:endParaRPr lang="en-US" dirty="0"/>
+              <a:rPr lang="en-US" dirty="0"/>
+              <a:t>The discriminator and perceptual loss</a:t>
+            </a:r>
           </a:p>
         </p:txBody>
       </p:sp>
@@ -9359,7 +9361,7 @@
           <p:cNvPr id="3" name="Text Placeholder 2">
             <a:extLst>
               <a:ext uri="{FF2B5EF4-FFF2-40B4-BE49-F238E27FC236}">
-                <a16:creationId xmlns:a16="http://schemas.microsoft.com/office/drawing/2014/main" id="{24C5B273-F203-8F8A-2DCB-CA3808468DEF}"/>
+                <a16:creationId xmlns:a16="http://schemas.microsoft.com/office/drawing/2014/main" id="{E1B04C4F-97BB-74FE-63E0-05D17BE83724}"/>
               </a:ext>
             </a:extLst>
           </p:cNvPr>
@@ -9372,12 +9374,38 @@
         </p:nvSpPr>
         <p:spPr/>
         <p:txBody>
-          <a:bodyPr/>
+          <a:bodyPr>
+            <a:normAutofit fontScale="92500" lnSpcReduction="10000"/>
+          </a:bodyPr>
           <a:lstStyle/>
           <a:p>
+            <a:pPr marL="114300" indent="0">
+              <a:buNone/>
+            </a:pPr>
             <a:r>
               <a:rPr lang="en-US" dirty="0"/>
-              <a:t>An open-source machine learning framework that provides a flexible and efficient platform for building and training deep learning models. It has become one of the most popular deep learning frameworks due to its flexibility, Pythonic interface, and extensive support for GPUs (Graphics Processing Units), which are crucial for accelerating deep learning computations.</a:t>
+              <a:t>The Discriminator works alongside the Encoder/Decoder (the Generator) to train the model.</a:t>
+            </a:r>
+          </a:p>
+          <a:p>
+            <a:pPr marL="114300" indent="0">
+              <a:buNone/>
+            </a:pPr>
+            <a:endParaRPr lang="en-US" dirty="0"/>
+          </a:p>
+          <a:p>
+            <a:r>
+              <a:rPr lang="en-US" dirty="0"/>
+              <a:t>Traditional codecs are often optimized with simple distance metrics like Mean Squared Error (MSE), which penalize any difference between the original and reconstructed signal, even if that difference is inaudible to humans.</a:t>
+            </a:r>
+          </a:p>
+          <a:p>
+            <a:endParaRPr lang="en-US" dirty="0"/>
+          </a:p>
+          <a:p>
+            <a:r>
+              <a:rPr lang="en-US" dirty="0"/>
+              <a:t>The Discriminator replaces or augments these simple metrics with an Adversarial Loss. This loss forces the Generator to produce audio that is statistically and perceptually indistinguishable from the real thing. It trains the model to focus on minimizing perceptible distortion, not just numerical error.</a:t>
             </a:r>
           </a:p>
         </p:txBody>
@@ -9385,7 +9413,7 @@
     </p:spTree>
     <p:extLst>
       <p:ext uri="{BB962C8B-B14F-4D97-AF65-F5344CB8AC3E}">
-        <p14:creationId xmlns:p14="http://schemas.microsoft.com/office/powerpoint/2010/main" val="194440167"/>
+        <p14:creationId xmlns:p14="http://schemas.microsoft.com/office/powerpoint/2010/main" val="593264006"/>
       </p:ext>
     </p:extLst>
   </p:cSld>
@@ -9400,7 +9428,7 @@
   <p:cSld>
     <p:spTree>
       <p:nvGrpSpPr>
-        <p:cNvPr id="1" name="Shape 176"/>
+        <p:cNvPr id="1" name=""/>
         <p:cNvGrpSpPr/>
         <p:nvPr/>
       </p:nvGrpSpPr>
@@ -9414,50 +9442,44 @@
       </p:grpSpPr>
       <p:sp>
         <p:nvSpPr>
-          <p:cNvPr id="177" name="Google Shape;177;p31"/>
-          <p:cNvSpPr txBox="1">
+          <p:cNvPr id="2" name="Title 1">
+            <a:extLst>
+              <a:ext uri="{FF2B5EF4-FFF2-40B4-BE49-F238E27FC236}">
+                <a16:creationId xmlns:a16="http://schemas.microsoft.com/office/drawing/2014/main" id="{3113D640-F98B-D682-A07E-9EAEF1ACB527}"/>
+              </a:ext>
+            </a:extLst>
+          </p:cNvPr>
+          <p:cNvSpPr>
             <a:spLocks noGrp="1"/>
           </p:cNvSpPr>
           <p:nvPr>
             <p:ph type="title"/>
           </p:nvPr>
         </p:nvSpPr>
-        <p:spPr>
-          <a:xfrm>
-            <a:off x="311700" y="445025"/>
-            <a:ext cx="8520600" cy="572700"/>
-          </a:xfrm>
-          <a:prstGeom prst="rect">
-            <a:avLst/>
-          </a:prstGeom>
-        </p:spPr>
+        <p:spPr/>
         <p:txBody>
-          <a:bodyPr spcFirstLastPara="1" wrap="square" lIns="91425" tIns="91425" rIns="91425" bIns="91425" anchor="t" anchorCtr="0">
+          <a:bodyPr>
             <a:normAutofit fontScale="90000"/>
           </a:bodyPr>
           <a:lstStyle/>
           <a:p>
-            <a:pPr marL="0" lvl="0" indent="0" algn="l" rtl="0">
-              <a:spcBef>
-                <a:spcPts val="0"/>
-              </a:spcBef>
-              <a:spcAft>
-                <a:spcPts val="0"/>
-              </a:spcAft>
-              <a:buNone/>
-            </a:pPr>
-            <a:r>
-              <a:rPr lang="en"/>
-              <a:t>Challenges</a:t>
-            </a:r>
-            <a:endParaRPr/>
+            <a:r>
+              <a:rPr lang="en-US" dirty="0"/>
+              <a:t>Residual Vector Quantization (RVQ)</a:t>
+            </a:r>
           </a:p>
         </p:txBody>
       </p:sp>
       <p:sp>
         <p:nvSpPr>
-          <p:cNvPr id="178" name="Google Shape;178;p31"/>
-          <p:cNvSpPr txBox="1">
+          <p:cNvPr id="3" name="Text Placeholder 2">
+            <a:extLst>
+              <a:ext uri="{FF2B5EF4-FFF2-40B4-BE49-F238E27FC236}">
+                <a16:creationId xmlns:a16="http://schemas.microsoft.com/office/drawing/2014/main" id="{D0993BD3-1F26-403A-558C-DCE40BEFC1FE}"/>
+              </a:ext>
+            </a:extLst>
+          </p:cNvPr>
+          <p:cNvSpPr>
             <a:spLocks noGrp="1"/>
           </p:cNvSpPr>
           <p:nvPr>
@@ -9467,71 +9489,80 @@
         <p:spPr>
           <a:xfrm>
             <a:off x="311700" y="1152475"/>
-            <a:ext cx="8520600" cy="3416400"/>
-          </a:xfrm>
-          <a:prstGeom prst="rect">
-            <a:avLst/>
-          </a:prstGeom>
+            <a:ext cx="8520600" cy="3766366"/>
+          </a:xfrm>
         </p:spPr>
         <p:txBody>
-          <a:bodyPr spcFirstLastPara="1" wrap="square" lIns="91425" tIns="91425" rIns="91425" bIns="91425" anchor="t" anchorCtr="0">
-            <a:normAutofit/>
+          <a:bodyPr>
+            <a:normAutofit fontScale="92500" lnSpcReduction="10000"/>
           </a:bodyPr>
           <a:lstStyle/>
           <a:p>
-            <a:pPr marL="457200" lvl="0" indent="-342900" algn="l" rtl="0">
-              <a:spcBef>
-                <a:spcPts val="0"/>
-              </a:spcBef>
-              <a:spcAft>
-                <a:spcPts val="0"/>
-              </a:spcAft>
-              <a:buSzPts val="1800"/>
-              <a:buChar char="●"/>
+            <a:pPr marL="114300" indent="0">
+              <a:buNone/>
             </a:pPr>
             <a:r>
-              <a:rPr lang="en"/>
-              <a:t>Data requirements</a:t>
-            </a:r>
-            <a:endParaRPr/>
-          </a:p>
-          <a:p>
-            <a:pPr marL="457200" lvl="0" indent="-342900" algn="l" rtl="0">
-              <a:spcBef>
-                <a:spcPts val="0"/>
-              </a:spcBef>
-              <a:spcAft>
-                <a:spcPts val="0"/>
-              </a:spcAft>
-              <a:buSzPts val="1800"/>
-              <a:buChar char="●"/>
-            </a:pPr>
-            <a:r>
-              <a:rPr lang="en"/>
-              <a:t>Generalization</a:t>
-            </a:r>
-            <a:endParaRPr/>
-          </a:p>
-          <a:p>
-            <a:pPr marL="457200" lvl="0" indent="-342900" algn="l" rtl="0">
-              <a:spcBef>
-                <a:spcPts val="0"/>
-              </a:spcBef>
-              <a:spcAft>
-                <a:spcPts val="0"/>
-              </a:spcAft>
-              <a:buSzPts val="1800"/>
-              <a:buChar char="●"/>
-            </a:pPr>
-            <a:r>
-              <a:rPr lang="en"/>
-              <a:t>Real-Time Audio Coding</a:t>
-            </a:r>
-            <a:endParaRPr/>
+              <a:rPr lang="en-US" dirty="0"/>
+              <a:t>Residual Vector Quantization (RVQ) is the key component used in neural audio codecs (</a:t>
+            </a:r>
+            <a:r>
+              <a:rPr lang="en-US" dirty="0" err="1"/>
+              <a:t>SoundStream</a:t>
+            </a:r>
+            <a:r>
+              <a:rPr lang="en-US" dirty="0"/>
+              <a:t>, </a:t>
+            </a:r>
+            <a:r>
+              <a:rPr lang="en-US" dirty="0" err="1"/>
+              <a:t>EnCodec</a:t>
+            </a:r>
+            <a:r>
+              <a:rPr lang="en-US" dirty="0"/>
+              <a:t>) to convert a continuous, complex representation (the neural network's latent vector) into a sequence of discrete, compact integers (tokens).</a:t>
+            </a:r>
+          </a:p>
+          <a:p>
+            <a:r>
+              <a:rPr lang="en-US" dirty="0"/>
+              <a:t>It maps an input vector to the closest code vector in a learned dictionary (a codebook). This is a lossy step, as the input vector is replaced by its nearest neighbor.</a:t>
+            </a:r>
+          </a:p>
+          <a:p>
+            <a:r>
+              <a:rPr lang="en-US" dirty="0"/>
+              <a:t>RVQ addresses the lossy nature of VQ by using a series of cascaded VQ layers instead of just one:</a:t>
+            </a:r>
+          </a:p>
+          <a:p>
+            <a:pPr lvl="1"/>
+            <a:r>
+              <a:rPr lang="en-US" dirty="0"/>
+              <a:t>Layer 1: Quantizes the input vector to get the first code. A residual is calculated.</a:t>
+            </a:r>
+          </a:p>
+          <a:p>
+            <a:pPr lvl="1"/>
+            <a:r>
+              <a:rPr lang="en-US" dirty="0"/>
+              <a:t> Layer 2: Quantizes the residual from Layer 1 to get a second code. A new, smaller residual is calculated.</a:t>
+            </a:r>
+          </a:p>
+          <a:p>
+            <a:pPr lvl="1"/>
+            <a:r>
+              <a:rPr lang="en-US" dirty="0"/>
+              <a:t>Repeat: This process is repeated across N layers, with each layer refining the quantization of the previous layer's residual.</a:t>
+            </a:r>
           </a:p>
         </p:txBody>
       </p:sp>
     </p:spTree>
+    <p:extLst>
+      <p:ext uri="{BB962C8B-B14F-4D97-AF65-F5344CB8AC3E}">
+        <p14:creationId xmlns:p14="http://schemas.microsoft.com/office/powerpoint/2010/main" val="3817001327"/>
+      </p:ext>
+    </p:extLst>
   </p:cSld>
   <p:clrMapOvr>
     <a:masterClrMapping/>
@@ -9561,6 +9592,442 @@
           <p:cNvPr id="2" name="Title 1">
             <a:extLst>
               <a:ext uri="{FF2B5EF4-FFF2-40B4-BE49-F238E27FC236}">
+                <a16:creationId xmlns:a16="http://schemas.microsoft.com/office/drawing/2014/main" id="{836B4AA9-2ACC-BC41-0F70-26BB6A0A1F10}"/>
+              </a:ext>
+            </a:extLst>
+          </p:cNvPr>
+          <p:cNvSpPr>
+            <a:spLocks noGrp="1"/>
+          </p:cNvSpPr>
+          <p:nvPr>
+            <p:ph type="title"/>
+          </p:nvPr>
+        </p:nvSpPr>
+        <p:spPr/>
+        <p:txBody>
+          <a:bodyPr>
+            <a:normAutofit fontScale="90000"/>
+          </a:bodyPr>
+          <a:lstStyle/>
+          <a:p>
+            <a:r>
+              <a:rPr lang="en-US" dirty="0"/>
+              <a:t>The transformer layer: context through attention</a:t>
+            </a:r>
+          </a:p>
+        </p:txBody>
+      </p:sp>
+      <p:sp>
+        <p:nvSpPr>
+          <p:cNvPr id="3" name="Text Placeholder 2">
+            <a:extLst>
+              <a:ext uri="{FF2B5EF4-FFF2-40B4-BE49-F238E27FC236}">
+                <a16:creationId xmlns:a16="http://schemas.microsoft.com/office/drawing/2014/main" id="{E3E44FA5-7145-3A68-B311-2DFB9687C83F}"/>
+              </a:ext>
+            </a:extLst>
+          </p:cNvPr>
+          <p:cNvSpPr>
+            <a:spLocks noGrp="1"/>
+          </p:cNvSpPr>
+          <p:nvPr>
+            <p:ph type="body" idx="1"/>
+          </p:nvPr>
+        </p:nvSpPr>
+        <p:spPr/>
+        <p:txBody>
+          <a:bodyPr>
+            <a:normAutofit/>
+          </a:bodyPr>
+          <a:lstStyle/>
+          <a:p>
+            <a:pPr marL="114300" indent="0">
+              <a:buNone/>
+            </a:pPr>
+            <a:r>
+              <a:rPr lang="en-US" dirty="0"/>
+              <a:t>A mechanism that allows the model to weigh the relevance of every other element in the sequence (all audio frames) when processing a single element. Models the statistics of the discrete audio tokens (the RVQ codes) to allow an entropy coder to assign shorter bitstrings to common token sequences, achieving a smaller final file size.</a:t>
+            </a:r>
+          </a:p>
+          <a:p>
+            <a:pPr marL="114300" indent="0">
+              <a:buNone/>
+            </a:pPr>
+            <a:endParaRPr lang="en-US" dirty="0"/>
+          </a:p>
+          <a:p>
+            <a:pPr marL="114300" indent="0">
+              <a:buNone/>
+            </a:pPr>
+            <a:r>
+              <a:rPr lang="en-US" dirty="0"/>
+              <a:t>A transformer layer is composed of two main sub-layers:</a:t>
+            </a:r>
+          </a:p>
+          <a:p>
+            <a:pPr lvl="1"/>
+            <a:r>
+              <a:rPr lang="en-US" dirty="0"/>
+              <a:t>Multi-Head Self-Attention: Computes the contextual weightings between all parts of the sequence.</a:t>
+            </a:r>
+          </a:p>
+          <a:p>
+            <a:pPr lvl="1"/>
+            <a:r>
+              <a:rPr lang="en-US" dirty="0"/>
+              <a:t>Feed-Forward Network (FFN): A simple neural network applied independently to each position to further process the information gathered by the attention layer.</a:t>
+            </a:r>
+          </a:p>
+        </p:txBody>
+      </p:sp>
+    </p:spTree>
+    <p:extLst>
+      <p:ext uri="{BB962C8B-B14F-4D97-AF65-F5344CB8AC3E}">
+        <p14:creationId xmlns:p14="http://schemas.microsoft.com/office/powerpoint/2010/main" val="2290932921"/>
+      </p:ext>
+    </p:extLst>
+  </p:cSld>
+  <p:clrMapOvr>
+    <a:masterClrMapping/>
+  </p:clrMapOvr>
+</p:sld>
+</file>
+
+<file path=ppt/slides/slide24.xml><?xml version="1.0" encoding="utf-8"?>
+<p:sld xmlns:a="http://schemas.openxmlformats.org/drawingml/2006/main" xmlns:r="http://schemas.openxmlformats.org/officeDocument/2006/relationships" xmlns:p="http://schemas.openxmlformats.org/presentationml/2006/main">
+  <p:cSld>
+    <p:spTree>
+      <p:nvGrpSpPr>
+        <p:cNvPr id="1" name=""/>
+        <p:cNvGrpSpPr/>
+        <p:nvPr/>
+      </p:nvGrpSpPr>
+      <p:grpSpPr>
+        <a:xfrm>
+          <a:off x="0" y="0"/>
+          <a:ext cx="0" cy="0"/>
+          <a:chOff x="0" y="0"/>
+          <a:chExt cx="0" cy="0"/>
+        </a:xfrm>
+      </p:grpSpPr>
+      <p:sp>
+        <p:nvSpPr>
+          <p:cNvPr id="2" name="Title 1">
+            <a:extLst>
+              <a:ext uri="{FF2B5EF4-FFF2-40B4-BE49-F238E27FC236}">
+                <a16:creationId xmlns:a16="http://schemas.microsoft.com/office/drawing/2014/main" id="{5844F49E-F3E9-EC2A-AF5C-735A2689F9B2}"/>
+              </a:ext>
+            </a:extLst>
+          </p:cNvPr>
+          <p:cNvSpPr>
+            <a:spLocks noGrp="1"/>
+          </p:cNvSpPr>
+          <p:nvPr>
+            <p:ph type="title"/>
+          </p:nvPr>
+        </p:nvSpPr>
+        <p:spPr/>
+        <p:txBody>
+          <a:bodyPr>
+            <a:normAutofit fontScale="90000"/>
+          </a:bodyPr>
+          <a:lstStyle/>
+          <a:p>
+            <a:r>
+              <a:rPr lang="en-US" dirty="0" err="1"/>
+              <a:t>Pytorch</a:t>
+            </a:r>
+            <a:endParaRPr lang="en-US" dirty="0"/>
+          </a:p>
+        </p:txBody>
+      </p:sp>
+      <p:sp>
+        <p:nvSpPr>
+          <p:cNvPr id="3" name="Text Placeholder 2">
+            <a:extLst>
+              <a:ext uri="{FF2B5EF4-FFF2-40B4-BE49-F238E27FC236}">
+                <a16:creationId xmlns:a16="http://schemas.microsoft.com/office/drawing/2014/main" id="{24C5B273-F203-8F8A-2DCB-CA3808468DEF}"/>
+              </a:ext>
+            </a:extLst>
+          </p:cNvPr>
+          <p:cNvSpPr>
+            <a:spLocks noGrp="1"/>
+          </p:cNvSpPr>
+          <p:nvPr>
+            <p:ph type="body" idx="1"/>
+          </p:nvPr>
+        </p:nvSpPr>
+        <p:spPr/>
+        <p:txBody>
+          <a:bodyPr/>
+          <a:lstStyle/>
+          <a:p>
+            <a:pPr marL="114300" indent="0">
+              <a:buNone/>
+            </a:pPr>
+            <a:r>
+              <a:rPr lang="en-US" dirty="0"/>
+              <a:t>An open-source machine learning framework that provides a flexible and efficient platform for building and training deep learning models. It has become one of the most popular deep learning frameworks due to its flexibility, Pythonic interface, and extensive support for GPUs (Graphics Processing Units), which are crucial for accelerating deep learning computations.</a:t>
+            </a:r>
+          </a:p>
+          <a:p>
+            <a:pPr marL="114300" indent="0">
+              <a:buNone/>
+            </a:pPr>
+            <a:endParaRPr lang="en-US" dirty="0"/>
+          </a:p>
+          <a:p>
+            <a:pPr marL="114300" indent="0">
+              <a:buNone/>
+            </a:pPr>
+            <a:r>
+              <a:rPr lang="en-US" i="1" dirty="0" err="1"/>
+              <a:t>Torchaudio</a:t>
+            </a:r>
+            <a:r>
+              <a:rPr lang="en-US" i="1" dirty="0"/>
+              <a:t>: </a:t>
+            </a:r>
+            <a:r>
+              <a:rPr lang="en-US" dirty="0"/>
+              <a:t>dedicated library for audio and speech processing. It provides GPU-accelerated implementations of essential audio signal processing functions (like Spectrogram, Mel-spectrogram, Resampling, etc.) directly integrated with </a:t>
+            </a:r>
+            <a:r>
+              <a:rPr lang="en-US" dirty="0" err="1"/>
+              <a:t>PyTorch's</a:t>
+            </a:r>
+            <a:r>
+              <a:rPr lang="en-US" dirty="0"/>
+              <a:t> tensor structure.</a:t>
+            </a:r>
+          </a:p>
+        </p:txBody>
+      </p:sp>
+    </p:spTree>
+    <p:extLst>
+      <p:ext uri="{BB962C8B-B14F-4D97-AF65-F5344CB8AC3E}">
+        <p14:creationId xmlns:p14="http://schemas.microsoft.com/office/powerpoint/2010/main" val="194440167"/>
+      </p:ext>
+    </p:extLst>
+  </p:cSld>
+  <p:clrMapOvr>
+    <a:masterClrMapping/>
+  </p:clrMapOvr>
+</p:sld>
+</file>
+
+<file path=ppt/slides/slide25.xml><?xml version="1.0" encoding="utf-8"?>
+<p:sld xmlns:a="http://schemas.openxmlformats.org/drawingml/2006/main" xmlns:r="http://schemas.openxmlformats.org/officeDocument/2006/relationships" xmlns:p="http://schemas.openxmlformats.org/presentationml/2006/main">
+  <p:cSld>
+    <p:spTree>
+      <p:nvGrpSpPr>
+        <p:cNvPr id="1" name="Shape 176"/>
+        <p:cNvGrpSpPr/>
+        <p:nvPr/>
+      </p:nvGrpSpPr>
+      <p:grpSpPr>
+        <a:xfrm>
+          <a:off x="0" y="0"/>
+          <a:ext cx="0" cy="0"/>
+          <a:chOff x="0" y="0"/>
+          <a:chExt cx="0" cy="0"/>
+        </a:xfrm>
+      </p:grpSpPr>
+      <p:sp>
+        <p:nvSpPr>
+          <p:cNvPr id="177" name="Google Shape;177;p31"/>
+          <p:cNvSpPr txBox="1">
+            <a:spLocks noGrp="1"/>
+          </p:cNvSpPr>
+          <p:nvPr>
+            <p:ph type="title"/>
+          </p:nvPr>
+        </p:nvSpPr>
+        <p:spPr>
+          <a:xfrm>
+            <a:off x="311700" y="445025"/>
+            <a:ext cx="8520600" cy="572700"/>
+          </a:xfrm>
+          <a:prstGeom prst="rect">
+            <a:avLst/>
+          </a:prstGeom>
+        </p:spPr>
+        <p:txBody>
+          <a:bodyPr spcFirstLastPara="1" wrap="square" lIns="91425" tIns="91425" rIns="91425" bIns="91425" anchor="t" anchorCtr="0">
+            <a:normAutofit fontScale="90000"/>
+          </a:bodyPr>
+          <a:lstStyle/>
+          <a:p>
+            <a:pPr marL="0" lvl="0" indent="0" algn="l" rtl="0">
+              <a:spcBef>
+                <a:spcPts val="0"/>
+              </a:spcBef>
+              <a:spcAft>
+                <a:spcPts val="0"/>
+              </a:spcAft>
+              <a:buNone/>
+            </a:pPr>
+            <a:r>
+              <a:rPr lang="en" dirty="0"/>
+              <a:t>Challenges (current limitations)</a:t>
+            </a:r>
+            <a:endParaRPr dirty="0"/>
+          </a:p>
+        </p:txBody>
+      </p:sp>
+      <p:sp>
+        <p:nvSpPr>
+          <p:cNvPr id="178" name="Google Shape;178;p31"/>
+          <p:cNvSpPr txBox="1">
+            <a:spLocks noGrp="1"/>
+          </p:cNvSpPr>
+          <p:nvPr>
+            <p:ph type="body" idx="1"/>
+          </p:nvPr>
+        </p:nvSpPr>
+        <p:spPr>
+          <a:xfrm>
+            <a:off x="311700" y="1152475"/>
+            <a:ext cx="8520600" cy="3829428"/>
+          </a:xfrm>
+          <a:prstGeom prst="rect">
+            <a:avLst/>
+          </a:prstGeom>
+        </p:spPr>
+        <p:txBody>
+          <a:bodyPr spcFirstLastPara="1" wrap="square" lIns="91425" tIns="91425" rIns="91425" bIns="91425" anchor="t" anchorCtr="0">
+            <a:normAutofit/>
+          </a:bodyPr>
+          <a:lstStyle/>
+          <a:p>
+            <a:pPr>
+              <a:buFont typeface="Arial" panose="020B0604020202020204" pitchFamily="34" charset="0"/>
+              <a:buChar char="•"/>
+            </a:pPr>
+            <a:r>
+              <a:rPr lang="en-US" dirty="0"/>
+              <a:t>Computational Complexity (real-time)</a:t>
+            </a:r>
+          </a:p>
+          <a:p>
+            <a:pPr lvl="1">
+              <a:buFont typeface="Arial" panose="020B0604020202020204" pitchFamily="34" charset="0"/>
+              <a:buChar char="•"/>
+            </a:pPr>
+            <a:r>
+              <a:rPr lang="en-US" dirty="0"/>
+              <a:t>Large, data-driven architectures require significant compute power, challenging deployment on resource-limited devices (like smartphones).</a:t>
+            </a:r>
+          </a:p>
+          <a:p>
+            <a:pPr lvl="1">
+              <a:buFont typeface="Arial" panose="020B0604020202020204" pitchFamily="34" charset="0"/>
+              <a:buChar char="•"/>
+            </a:pPr>
+            <a:r>
+              <a:rPr lang="en-US" dirty="0"/>
+              <a:t>Achieving low latency for real-time communication systems remains critical.</a:t>
+            </a:r>
+          </a:p>
+          <a:p>
+            <a:pPr lvl="0" algn="l" rtl="0">
+              <a:spcBef>
+                <a:spcPts val="0"/>
+              </a:spcBef>
+              <a:spcAft>
+                <a:spcPts val="0"/>
+              </a:spcAft>
+              <a:buSzPts val="1800"/>
+              <a:buFont typeface="Arial" panose="020B0604020202020204" pitchFamily="34" charset="0"/>
+              <a:buChar char="•"/>
+            </a:pPr>
+            <a:r>
+              <a:rPr lang="en-US" dirty="0"/>
+              <a:t>Generalization</a:t>
+            </a:r>
+          </a:p>
+          <a:p>
+            <a:pPr lvl="1" indent="-342900">
+              <a:buSzPts val="1800"/>
+              <a:buFont typeface="Arial" panose="020B0604020202020204" pitchFamily="34" charset="0"/>
+              <a:buChar char="•"/>
+            </a:pPr>
+            <a:r>
+              <a:rPr lang="en-US" dirty="0"/>
+              <a:t>Models often struggle to generalize across different acoustic domains (speech vs. music vs. environment).</a:t>
+            </a:r>
+          </a:p>
+          <a:p>
+            <a:pPr lvl="1" indent="-342900">
+              <a:buSzPts val="1800"/>
+              <a:buFont typeface="Arial" panose="020B0604020202020204" pitchFamily="34" charset="0"/>
+              <a:buChar char="•"/>
+            </a:pPr>
+            <a:r>
+              <a:rPr lang="en-US" dirty="0"/>
+              <a:t>Training requires massive, undifferentiated audio datasets, complicating data modeling and control.</a:t>
+            </a:r>
+          </a:p>
+          <a:p>
+            <a:pPr lvl="0" algn="l" rtl="0">
+              <a:spcBef>
+                <a:spcPts val="0"/>
+              </a:spcBef>
+              <a:spcAft>
+                <a:spcPts val="0"/>
+              </a:spcAft>
+              <a:buSzPts val="1800"/>
+              <a:buFont typeface="Arial" panose="020B0604020202020204" pitchFamily="34" charset="0"/>
+              <a:buChar char="•"/>
+            </a:pPr>
+            <a:r>
+              <a:rPr lang="en-US" dirty="0"/>
+              <a:t>Subjective Quality Evaluation</a:t>
+            </a:r>
+          </a:p>
+          <a:p>
+            <a:pPr lvl="1" indent="-342900">
+              <a:buSzPts val="1800"/>
+              <a:buFont typeface="Arial" panose="020B0604020202020204" pitchFamily="34" charset="0"/>
+              <a:buChar char="•"/>
+            </a:pPr>
+            <a:r>
+              <a:rPr lang="en-US" dirty="0"/>
+              <a:t>Subjective listening tests (MUSHRA) are resource-intensive to scale.</a:t>
+            </a:r>
+            <a:endParaRPr dirty="0"/>
+          </a:p>
+        </p:txBody>
+      </p:sp>
+    </p:spTree>
+  </p:cSld>
+  <p:clrMapOvr>
+    <a:masterClrMapping/>
+  </p:clrMapOvr>
+</p:sld>
+</file>
+
+<file path=ppt/slides/slide26.xml><?xml version="1.0" encoding="utf-8"?>
+<p:sld xmlns:a="http://schemas.openxmlformats.org/drawingml/2006/main" xmlns:r="http://schemas.openxmlformats.org/officeDocument/2006/relationships" xmlns:p="http://schemas.openxmlformats.org/presentationml/2006/main">
+  <p:cSld>
+    <p:spTree>
+      <p:nvGrpSpPr>
+        <p:cNvPr id="1" name=""/>
+        <p:cNvGrpSpPr/>
+        <p:nvPr/>
+      </p:nvGrpSpPr>
+      <p:grpSpPr>
+        <a:xfrm>
+          <a:off x="0" y="0"/>
+          <a:ext cx="0" cy="0"/>
+          <a:chOff x="0" y="0"/>
+          <a:chExt cx="0" cy="0"/>
+        </a:xfrm>
+      </p:grpSpPr>
+      <p:sp>
+        <p:nvSpPr>
+          <p:cNvPr id="2" name="Title 1">
+            <a:extLst>
+              <a:ext uri="{FF2B5EF4-FFF2-40B4-BE49-F238E27FC236}">
                 <a16:creationId xmlns:a16="http://schemas.microsoft.com/office/drawing/2014/main" id="{0C4FAA40-2498-D673-2F6C-27CF1F0DC41B}"/>
               </a:ext>
             </a:extLst>
@@ -9687,6 +10154,21 @@
               <a:rPr lang="en-US" dirty="0">
                 <a:hlinkClick r:id="rId2"/>
               </a:rPr>
+              <a:t>https://</a:t>
+            </a:r>
+            <a:r>
+              <a:rPr lang="en-US" dirty="0" err="1">
+                <a:hlinkClick r:id="rId2"/>
+              </a:rPr>
+              <a:t>pytorch.org</a:t>
+            </a:r>
+            <a:endParaRPr lang="en-US" dirty="0"/>
+          </a:p>
+          <a:p>
+            <a:r>
+              <a:rPr lang="en-US" dirty="0">
+                <a:hlinkClick r:id="rId3"/>
+              </a:rPr>
               <a:t>https://github.com/xserra/audio-coding-materials/</a:t>
             </a:r>
             <a:endParaRPr lang="en-US" dirty="0"/>
@@ -9710,7 +10192,7 @@
               <a:t>examples/convolutional-autoencoder-</a:t>
             </a:r>
             <a:r>
-              <a:rPr lang="en-US"/>
+              <a:rPr lang="en-US" dirty="0" err="1"/>
               <a:t>complex.ipynb</a:t>
             </a:r>
             <a:endParaRPr lang="en-US" dirty="0"/>

</xml_diff>